<commit_message>
Added the result of the discussion about metadata at the end of metadata slides
</commit_message>
<xml_diff>
--- a/docs/presentations/OBI workshop Oct 2011 Philly/Metadata_requirements.pptx
+++ b/docs/presentations/OBI workshop Oct 2011 Philly/Metadata_requirements.pptx
@@ -5,7 +5,7 @@
     <p:sldMasterId id="2147483648" r:id="rId1"/>
   </p:sldMasterIdLst>
   <p:notesMasterIdLst>
-    <p:notesMasterId r:id="rId23"/>
+    <p:notesMasterId r:id="rId26"/>
   </p:notesMasterIdLst>
   <p:sldIdLst>
     <p:sldId id="256" r:id="rId2"/>
@@ -28,7 +28,10 @@
     <p:sldId id="285" r:id="rId19"/>
     <p:sldId id="286" r:id="rId20"/>
     <p:sldId id="266" r:id="rId21"/>
-    <p:sldId id="265" r:id="rId22"/>
+    <p:sldId id="287" r:id="rId22"/>
+    <p:sldId id="288" r:id="rId23"/>
+    <p:sldId id="265" r:id="rId24"/>
+    <p:sldId id="283" r:id="rId25"/>
   </p:sldIdLst>
   <p:sldSz cx="9144000" cy="6858000" type="screen4x3"/>
   <p:notesSz cx="6858000" cy="9144000"/>
@@ -944,7 +947,7 @@
             <a:fld id="{250A6EB9-2939-D34C-A9F4-6DE9E148810E}" type="slidenum">
               <a:rPr lang="en-US" smtClean="0"/>
               <a:pPr/>
-              <a:t>21</a:t>
+              <a:t>23</a:t>
             </a:fld>
             <a:endParaRPr lang="en-US"/>
           </a:p>
@@ -3980,7 +3983,7 @@
           <a:p>
             <a:r>
               <a:rPr lang="en-US" b="1" dirty="0" smtClean="0"/>
-              <a:t>IAO additional metadata proposal </a:t>
+              <a:t>Metadata needs</a:t>
             </a:r>
             <a:endParaRPr lang="en-US" b="1" dirty="0"/>
           </a:p>
@@ -4018,6 +4021,13 @@
   <p:clrMapOvr>
     <a:masterClrMapping/>
   </p:clrMapOvr>
+  <p:timing>
+    <p:tnLst>
+      <p:par>
+        <p:cTn id="1" dur="indefinite" restart="never" nodeType="tmRoot"/>
+      </p:par>
+    </p:tnLst>
+  </p:timing>
 </p:sld>
 </file>
 
@@ -4209,6 +4219,13 @@
   <p:clrMapOvr>
     <a:masterClrMapping/>
   </p:clrMapOvr>
+  <p:timing>
+    <p:tnLst>
+      <p:par>
+        <p:cTn id="1" dur="indefinite" restart="never" nodeType="tmRoot"/>
+      </p:par>
+    </p:tnLst>
+  </p:timing>
 </p:sld>
 </file>
 
@@ -4342,6 +4359,13 @@
   <p:clrMapOvr>
     <a:masterClrMapping/>
   </p:clrMapOvr>
+  <p:timing>
+    <p:tnLst>
+      <p:par>
+        <p:cTn id="1" dur="indefinite" restart="never" nodeType="tmRoot"/>
+      </p:par>
+    </p:tnLst>
+  </p:timing>
 </p:sld>
 </file>
 
@@ -4459,6 +4483,13 @@
   <p:clrMapOvr>
     <a:masterClrMapping/>
   </p:clrMapOvr>
+  <p:timing>
+    <p:tnLst>
+      <p:par>
+        <p:cTn id="1" dur="indefinite" restart="never" nodeType="tmRoot"/>
+      </p:par>
+    </p:tnLst>
+  </p:timing>
 </p:sld>
 </file>
 
@@ -4606,6 +4637,13 @@
   <p:clrMapOvr>
     <a:masterClrMapping/>
   </p:clrMapOvr>
+  <p:timing>
+    <p:tnLst>
+      <p:par>
+        <p:cTn id="1" dur="indefinite" restart="never" nodeType="tmRoot"/>
+      </p:par>
+    </p:tnLst>
+  </p:timing>
 </p:sld>
 </file>
 
@@ -4810,6 +4848,13 @@
   <p:clrMapOvr>
     <a:masterClrMapping/>
   </p:clrMapOvr>
+  <p:timing>
+    <p:tnLst>
+      <p:par>
+        <p:cTn id="1" dur="indefinite" restart="never" nodeType="tmRoot"/>
+      </p:par>
+    </p:tnLst>
+  </p:timing>
 </p:sld>
 </file>
 
@@ -4973,6 +5018,13 @@
   <p:clrMapOvr>
     <a:masterClrMapping/>
   </p:clrMapOvr>
+  <p:timing>
+    <p:tnLst>
+      <p:par>
+        <p:cTn id="1" dur="indefinite" restart="never" nodeType="tmRoot"/>
+      </p:par>
+    </p:tnLst>
+  </p:timing>
 </p:sld>
 </file>
 
@@ -5074,6 +5126,13 @@
   <p:clrMapOvr>
     <a:masterClrMapping/>
   </p:clrMapOvr>
+  <p:timing>
+    <p:tnLst>
+      <p:par>
+        <p:cTn id="1" dur="indefinite" restart="never" nodeType="tmRoot"/>
+      </p:par>
+    </p:tnLst>
+  </p:timing>
 </p:sld>
 </file>
 
@@ -5416,6 +5475,13 @@
   <p:clrMapOvr>
     <a:masterClrMapping/>
   </p:clrMapOvr>
+  <p:timing>
+    <p:tnLst>
+      <p:par>
+        <p:cTn id="1" dur="indefinite" restart="never" nodeType="tmRoot"/>
+      </p:par>
+    </p:tnLst>
+  </p:timing>
 </p:sld>
 </file>
 
@@ -5562,6 +5628,17 @@
             </a:r>
           </a:p>
           <a:p>
+            <a:pPr marL="635000" lvl="0" indent="-228600"/>
+            <a:endParaRPr lang="en-US" sz="1200" dirty="0" smtClean="0">
+              <a:solidFill>
+                <a:schemeClr val="tx1">
+                  <a:lumMod val="50000"/>
+                  <a:lumOff val="50000"/>
+                </a:schemeClr>
+              </a:solidFill>
+            </a:endParaRPr>
+          </a:p>
+          <a:p>
             <a:pPr>
               <a:buNone/>
             </a:pPr>
@@ -5668,6 +5745,13 @@
   <p:clrMapOvr>
     <a:masterClrMapping/>
   </p:clrMapOvr>
+  <p:timing>
+    <p:tnLst>
+      <p:par>
+        <p:cTn id="1" dur="indefinite" restart="never" nodeType="tmRoot"/>
+      </p:par>
+    </p:tnLst>
+  </p:timing>
 </p:sld>
 </file>
 
@@ -5738,7 +5822,7 @@
         </p:nvSpPr>
         <p:spPr>
           <a:xfrm>
-            <a:off x="165100" y="1176338"/>
+            <a:off x="165100" y="1303338"/>
             <a:ext cx="8902700" cy="5211762"/>
           </a:xfrm>
         </p:spPr>
@@ -5869,6 +5953,17 @@
             </a:endParaRPr>
           </a:p>
           <a:p>
+            <a:pPr marL="520700" indent="-228600"/>
+            <a:endParaRPr lang="en-US" sz="1200" dirty="0" smtClean="0">
+              <a:solidFill>
+                <a:schemeClr val="tx1">
+                  <a:lumMod val="50000"/>
+                  <a:lumOff val="50000"/>
+                </a:schemeClr>
+              </a:solidFill>
+            </a:endParaRPr>
+          </a:p>
+          <a:p>
             <a:pPr>
               <a:buNone/>
             </a:pPr>
@@ -5927,6 +6022,13 @@
   <p:clrMapOvr>
     <a:masterClrMapping/>
   </p:clrMapOvr>
+  <p:timing>
+    <p:tnLst>
+      <p:par>
+        <p:cTn id="1" dur="indefinite" restart="never" nodeType="tmRoot"/>
+      </p:par>
+    </p:tnLst>
+  </p:timing>
 </p:sld>
 </file>
 
@@ -6039,6 +6141,13 @@
   <p:clrMapOvr>
     <a:masterClrMapping/>
   </p:clrMapOvr>
+  <p:timing>
+    <p:tnLst>
+      <p:par>
+        <p:cTn id="1" dur="indefinite" restart="never" nodeType="tmRoot"/>
+      </p:par>
+    </p:tnLst>
+  </p:timing>
 </p:sld>
 </file>
 
@@ -6117,8 +6226,9 @@
             </a:pPr>
             <a:r>
               <a:rPr lang="en-US" sz="3000" b="1" dirty="0" smtClean="0"/>
-              <a:t>“Editor preferred definition”</a:t>
-            </a:r>
+              <a:t>“Alternative description”</a:t>
+            </a:r>
+            <a:endParaRPr lang="en-US" sz="3000" b="1" dirty="0" smtClean="0"/>
           </a:p>
           <a:p>
             <a:pPr lvl="1"/>
@@ -6171,6 +6281,13 @@
   <p:clrMapOvr>
     <a:masterClrMapping/>
   </p:clrMapOvr>
+  <p:timing>
+    <p:tnLst>
+      <p:par>
+        <p:cTn id="1" dur="indefinite" restart="never" nodeType="tmRoot"/>
+      </p:par>
+    </p:tnLst>
+  </p:timing>
 </p:sld>
 </file>
 
@@ -6193,6 +6310,992 @@
       </p:grpSpPr>
       <p:sp>
         <p:nvSpPr>
+          <p:cNvPr id="2" name="TextBox 1"/>
+          <p:cNvSpPr txBox="1"/>
+          <p:nvPr/>
+        </p:nvSpPr>
+        <p:spPr>
+          <a:xfrm>
+            <a:off x="609600" y="1295400"/>
+            <a:ext cx="8077200" cy="5878532"/>
+          </a:xfrm>
+          <a:prstGeom prst="rect">
+            <a:avLst/>
+          </a:prstGeom>
+          <a:noFill/>
+        </p:spPr>
+        <p:txBody>
+          <a:bodyPr wrap="square" rtlCol="0">
+            <a:spAutoFit/>
+          </a:bodyPr>
+          <a:lstStyle/>
+          <a:p>
+            <a:r>
+              <a:rPr lang="en-US" sz="2800" b="1" dirty="0" smtClean="0">
+                <a:solidFill>
+                  <a:schemeClr val="bg1">
+                    <a:lumMod val="50000"/>
+                  </a:schemeClr>
+                </a:solidFill>
+              </a:rPr>
+              <a:t>Simple changes of genus :</a:t>
+            </a:r>
+          </a:p>
+          <a:p>
+            <a:endParaRPr lang="en-US" sz="1600" dirty="0" smtClean="0">
+              <a:solidFill>
+                <a:schemeClr val="bg1">
+                  <a:lumMod val="50000"/>
+                </a:schemeClr>
+              </a:solidFill>
+            </a:endParaRPr>
+          </a:p>
+          <a:p>
+            <a:r>
+              <a:rPr lang="en-US" sz="2400" b="1" u="sng" dirty="0" smtClean="0">
+                <a:solidFill>
+                  <a:schemeClr val="bg1">
+                    <a:lumMod val="50000"/>
+                  </a:schemeClr>
+                </a:solidFill>
+              </a:rPr>
+              <a:t>Example 1 :   </a:t>
+            </a:r>
+            <a:r>
+              <a:rPr lang="en-US" sz="2400" b="1" u="sng" dirty="0" err="1" smtClean="0">
+                <a:solidFill>
+                  <a:schemeClr val="bg1">
+                    <a:lumMod val="50000"/>
+                  </a:schemeClr>
+                </a:solidFill>
+              </a:rPr>
+              <a:t>SO:gene</a:t>
+            </a:r>
+            <a:endParaRPr lang="en-US" sz="2400" b="1" u="sng" dirty="0" smtClean="0">
+              <a:solidFill>
+                <a:schemeClr val="bg1">
+                  <a:lumMod val="50000"/>
+                </a:schemeClr>
+              </a:solidFill>
+            </a:endParaRPr>
+          </a:p>
+          <a:p>
+            <a:endParaRPr lang="en-US" sz="1000" b="1" dirty="0" smtClean="0">
+              <a:solidFill>
+                <a:schemeClr val="bg1">
+                  <a:lumMod val="50000"/>
+                </a:schemeClr>
+              </a:solidFill>
+            </a:endParaRPr>
+          </a:p>
+          <a:p>
+            <a:r>
+              <a:rPr lang="en-US" sz="2000" b="1" dirty="0" smtClean="0">
+                <a:solidFill>
+                  <a:schemeClr val="bg1">
+                    <a:lumMod val="50000"/>
+                  </a:schemeClr>
+                </a:solidFill>
+              </a:rPr>
+              <a:t>SO def </a:t>
+            </a:r>
+            <a:r>
+              <a:rPr lang="en-US" sz="2000" dirty="0" smtClean="0">
+                <a:solidFill>
+                  <a:schemeClr val="bg1">
+                    <a:lumMod val="50000"/>
+                  </a:schemeClr>
+                </a:solidFill>
+              </a:rPr>
+              <a:t>- a </a:t>
+            </a:r>
+            <a:r>
+              <a:rPr lang="en-US" sz="2000" i="1" dirty="0" smtClean="0">
+                <a:solidFill>
+                  <a:srgbClr val="FF0000"/>
+                </a:solidFill>
+              </a:rPr>
+              <a:t>region (or regions) </a:t>
+            </a:r>
+            <a:r>
+              <a:rPr lang="en-US" sz="2000" dirty="0" smtClean="0">
+                <a:solidFill>
+                  <a:schemeClr val="bg1">
+                    <a:lumMod val="50000"/>
+                  </a:schemeClr>
+                </a:solidFill>
+              </a:rPr>
+              <a:t>that includes all of the sequence elements necessary to encode a functional transcript. . . . </a:t>
+            </a:r>
+          </a:p>
+          <a:p>
+            <a:endParaRPr lang="en-US" sz="2000" dirty="0" smtClean="0">
+              <a:solidFill>
+                <a:schemeClr val="bg1">
+                  <a:lumMod val="50000"/>
+                </a:schemeClr>
+              </a:solidFill>
+            </a:endParaRPr>
+          </a:p>
+          <a:p>
+            <a:r>
+              <a:rPr lang="en-US" sz="2000" b="1" dirty="0" err="1" smtClean="0">
+                <a:solidFill>
+                  <a:schemeClr val="bg1">
+                    <a:lumMod val="50000"/>
+                  </a:schemeClr>
+                </a:solidFill>
+              </a:rPr>
+              <a:t>ReO</a:t>
+            </a:r>
+            <a:r>
+              <a:rPr lang="en-US" sz="2000" b="1" dirty="0" smtClean="0">
+                <a:solidFill>
+                  <a:schemeClr val="bg1">
+                    <a:lumMod val="50000"/>
+                  </a:schemeClr>
+                </a:solidFill>
+              </a:rPr>
+              <a:t> def - </a:t>
+            </a:r>
+            <a:r>
+              <a:rPr lang="en-US" sz="2000" dirty="0" smtClean="0">
+                <a:solidFill>
+                  <a:schemeClr val="bg1">
+                    <a:lumMod val="50000"/>
+                  </a:schemeClr>
+                </a:solidFill>
+              </a:rPr>
+              <a:t>a </a:t>
+            </a:r>
+            <a:r>
+              <a:rPr lang="en-US" sz="2000" i="1" dirty="0" smtClean="0">
+                <a:solidFill>
+                  <a:srgbClr val="FF0000"/>
+                </a:solidFill>
+              </a:rPr>
+              <a:t>genetic locus </a:t>
+            </a:r>
+            <a:r>
+              <a:rPr lang="en-US" sz="2000" dirty="0" smtClean="0">
+                <a:solidFill>
+                  <a:schemeClr val="bg1">
+                    <a:lumMod val="50000"/>
+                  </a:schemeClr>
+                </a:solidFill>
+              </a:rPr>
+              <a:t>that includes all of the sequence elements necessary to encode a functional transcript . . </a:t>
+            </a:r>
+            <a:r>
+              <a:rPr lang="en-US" sz="1600" dirty="0" smtClean="0">
+                <a:solidFill>
+                  <a:schemeClr val="bg1">
+                    <a:lumMod val="50000"/>
+                  </a:schemeClr>
+                </a:solidFill>
+              </a:rPr>
+              <a:t>. </a:t>
+            </a:r>
+          </a:p>
+          <a:p>
+            <a:endParaRPr lang="en-US" sz="1600" dirty="0" smtClean="0">
+              <a:solidFill>
+                <a:schemeClr val="bg1">
+                  <a:lumMod val="50000"/>
+                </a:schemeClr>
+              </a:solidFill>
+            </a:endParaRPr>
+          </a:p>
+          <a:p>
+            <a:endParaRPr lang="en-US" sz="1600" dirty="0">
+              <a:solidFill>
+                <a:schemeClr val="bg1">
+                  <a:lumMod val="50000"/>
+                </a:schemeClr>
+              </a:solidFill>
+            </a:endParaRPr>
+          </a:p>
+          <a:p>
+            <a:r>
+              <a:rPr lang="en-US" sz="2400" b="1" u="sng" dirty="0" smtClean="0">
+                <a:solidFill>
+                  <a:schemeClr val="bg1">
+                    <a:lumMod val="50000"/>
+                  </a:schemeClr>
+                </a:solidFill>
+              </a:rPr>
+              <a:t>Example 2 :  </a:t>
+            </a:r>
+            <a:r>
+              <a:rPr lang="en-US" sz="2400" b="1" u="sng" dirty="0" err="1" smtClean="0">
+                <a:solidFill>
+                  <a:schemeClr val="bg1">
+                    <a:lumMod val="50000"/>
+                  </a:schemeClr>
+                </a:solidFill>
+              </a:rPr>
+              <a:t>OBI:assay</a:t>
+            </a:r>
+            <a:endParaRPr lang="en-US" sz="2400" b="1" u="sng" dirty="0" smtClean="0">
+              <a:solidFill>
+                <a:schemeClr val="bg1">
+                  <a:lumMod val="50000"/>
+                </a:schemeClr>
+              </a:solidFill>
+            </a:endParaRPr>
+          </a:p>
+          <a:p>
+            <a:endParaRPr lang="en-US" sz="1000" b="1" dirty="0" smtClean="0">
+              <a:solidFill>
+                <a:schemeClr val="bg1">
+                  <a:lumMod val="50000"/>
+                </a:schemeClr>
+              </a:solidFill>
+            </a:endParaRPr>
+          </a:p>
+          <a:p>
+            <a:r>
+              <a:rPr lang="en-US" sz="2000" b="1" dirty="0" smtClean="0">
+                <a:solidFill>
+                  <a:schemeClr val="bg1">
+                    <a:lumMod val="50000"/>
+                  </a:schemeClr>
+                </a:solidFill>
+              </a:rPr>
+              <a:t>OBI def </a:t>
+            </a:r>
+            <a:r>
+              <a:rPr lang="en-US" sz="2000" dirty="0" smtClean="0">
+                <a:solidFill>
+                  <a:schemeClr val="bg1">
+                    <a:lumMod val="50000"/>
+                  </a:schemeClr>
+                </a:solidFill>
+              </a:rPr>
+              <a:t>- a </a:t>
+            </a:r>
+            <a:r>
+              <a:rPr lang="en-US" sz="2000" i="1" dirty="0" smtClean="0">
+                <a:solidFill>
+                  <a:srgbClr val="FF0000"/>
+                </a:solidFill>
+              </a:rPr>
+              <a:t>planned process </a:t>
+            </a:r>
+            <a:r>
+              <a:rPr lang="en-US" sz="2000" dirty="0" smtClean="0">
+                <a:solidFill>
+                  <a:schemeClr val="bg1">
+                    <a:lumMod val="50000"/>
+                  </a:schemeClr>
+                </a:solidFill>
+              </a:rPr>
+              <a:t>with the objective to produce information about some </a:t>
+            </a:r>
+            <a:r>
+              <a:rPr lang="en-US" sz="2000" dirty="0" err="1" smtClean="0">
+                <a:solidFill>
+                  <a:schemeClr val="bg1">
+                    <a:lumMod val="50000"/>
+                  </a:schemeClr>
+                </a:solidFill>
+              </a:rPr>
+              <a:t>evaluant</a:t>
+            </a:r>
+            <a:endParaRPr lang="en-US" sz="2000" dirty="0" smtClean="0">
+              <a:solidFill>
+                <a:schemeClr val="bg1">
+                  <a:lumMod val="50000"/>
+                </a:schemeClr>
+              </a:solidFill>
+            </a:endParaRPr>
+          </a:p>
+          <a:p>
+            <a:endParaRPr lang="en-US" sz="2000" b="1" dirty="0" smtClean="0">
+              <a:solidFill>
+                <a:schemeClr val="bg1">
+                  <a:lumMod val="50000"/>
+                </a:schemeClr>
+              </a:solidFill>
+            </a:endParaRPr>
+          </a:p>
+          <a:p>
+            <a:r>
+              <a:rPr lang="en-US" sz="2000" b="1" dirty="0" err="1" smtClean="0">
+                <a:solidFill>
+                  <a:schemeClr val="bg1">
+                    <a:lumMod val="50000"/>
+                  </a:schemeClr>
+                </a:solidFill>
+              </a:rPr>
+              <a:t>ReO</a:t>
+            </a:r>
+            <a:r>
+              <a:rPr lang="en-US" sz="2000" b="1" dirty="0" smtClean="0">
+                <a:solidFill>
+                  <a:schemeClr val="bg1">
+                    <a:lumMod val="50000"/>
+                  </a:schemeClr>
+                </a:solidFill>
+              </a:rPr>
+              <a:t> def </a:t>
+            </a:r>
+            <a:r>
+              <a:rPr lang="en-US" sz="2000" dirty="0" smtClean="0">
+                <a:solidFill>
+                  <a:schemeClr val="bg1">
+                    <a:lumMod val="50000"/>
+                  </a:schemeClr>
+                </a:solidFill>
+              </a:rPr>
+              <a:t>- a </a:t>
+            </a:r>
+            <a:r>
+              <a:rPr lang="en-US" sz="2000" i="1" dirty="0" smtClean="0">
+                <a:solidFill>
+                  <a:srgbClr val="FF0000"/>
+                </a:solidFill>
+              </a:rPr>
+              <a:t>technique</a:t>
+            </a:r>
+            <a:r>
+              <a:rPr lang="en-US" sz="2000" dirty="0" smtClean="0">
+                <a:solidFill>
+                  <a:schemeClr val="bg1">
+                    <a:lumMod val="50000"/>
+                  </a:schemeClr>
+                </a:solidFill>
+              </a:rPr>
+              <a:t> with the objective to produce information about some </a:t>
+            </a:r>
+            <a:r>
+              <a:rPr lang="en-US" sz="2000" dirty="0" err="1" smtClean="0">
+                <a:solidFill>
+                  <a:schemeClr val="bg1">
+                    <a:lumMod val="50000"/>
+                  </a:schemeClr>
+                </a:solidFill>
+              </a:rPr>
+              <a:t>evaluant</a:t>
+            </a:r>
+            <a:endParaRPr lang="en-US" sz="2000" dirty="0">
+              <a:solidFill>
+                <a:schemeClr val="bg1">
+                  <a:lumMod val="50000"/>
+                </a:schemeClr>
+              </a:solidFill>
+            </a:endParaRPr>
+          </a:p>
+          <a:p>
+            <a:endParaRPr lang="en-US" sz="1600" dirty="0" smtClean="0">
+              <a:solidFill>
+                <a:schemeClr val="bg1">
+                  <a:lumMod val="50000"/>
+                </a:schemeClr>
+              </a:solidFill>
+            </a:endParaRPr>
+          </a:p>
+          <a:p>
+            <a:endParaRPr lang="en-US" sz="1600" dirty="0" smtClean="0">
+              <a:solidFill>
+                <a:schemeClr val="bg1">
+                  <a:lumMod val="50000"/>
+                </a:schemeClr>
+              </a:solidFill>
+            </a:endParaRPr>
+          </a:p>
+        </p:txBody>
+      </p:sp>
+      <p:sp>
+        <p:nvSpPr>
+          <p:cNvPr id="5" name="Title 1"/>
+          <p:cNvSpPr txBox="1">
+            <a:spLocks/>
+          </p:cNvSpPr>
+          <p:nvPr/>
+        </p:nvSpPr>
+        <p:spPr>
+          <a:xfrm>
+            <a:off x="457200" y="444500"/>
+            <a:ext cx="7848600" cy="1143000"/>
+          </a:xfrm>
+          <a:prstGeom prst="rect">
+            <a:avLst/>
+          </a:prstGeom>
+        </p:spPr>
+        <p:txBody>
+          <a:bodyPr vert="horz" lIns="91440" tIns="45720" rIns="91440" bIns="45720" rtlCol="0" anchor="ctr">
+            <a:normAutofit fontScale="90000" lnSpcReduction="10000"/>
+          </a:bodyPr>
+          <a:lstStyle/>
+          <a:p>
+            <a:pPr algn="ctr" defTabSz="457200">
+              <a:spcBef>
+                <a:spcPct val="0"/>
+              </a:spcBef>
+            </a:pPr>
+            <a:r>
+              <a:rPr lang="en-US" sz="4000" dirty="0" smtClean="0">
+                <a:solidFill>
+                  <a:schemeClr val="accent6">
+                    <a:lumMod val="75000"/>
+                  </a:schemeClr>
+                </a:solidFill>
+              </a:rPr>
+              <a:t>Examples of editor-preferred definitions in </a:t>
+            </a:r>
+            <a:r>
+              <a:rPr lang="en-US" sz="4000" dirty="0" err="1" smtClean="0">
+                <a:solidFill>
+                  <a:schemeClr val="accent6">
+                    <a:lumMod val="75000"/>
+                  </a:schemeClr>
+                </a:solidFill>
+              </a:rPr>
+              <a:t>ReO</a:t>
+            </a:r>
+            <a:endParaRPr lang="en-US" sz="4000" dirty="0" smtClean="0">
+              <a:solidFill>
+                <a:schemeClr val="accent6">
+                  <a:lumMod val="75000"/>
+                </a:schemeClr>
+              </a:solidFill>
+            </a:endParaRPr>
+          </a:p>
+          <a:p>
+            <a:pPr marL="0" marR="0" lvl="0" indent="0" algn="ctr" defTabSz="457200" rtl="0" eaLnBrk="1" fontAlgn="auto" latinLnBrk="0" hangingPunct="1">
+              <a:lnSpc>
+                <a:spcPct val="100000"/>
+              </a:lnSpc>
+              <a:spcBef>
+                <a:spcPct val="0"/>
+              </a:spcBef>
+              <a:spcAft>
+                <a:spcPts val="0"/>
+              </a:spcAft>
+              <a:buClrTx/>
+              <a:buSzTx/>
+              <a:buFontTx/>
+              <a:buNone/>
+              <a:tabLst/>
+              <a:defRPr/>
+            </a:pPr>
+            <a:endParaRPr kumimoji="0" lang="en-US" sz="4400" b="0" i="0" u="none" strike="noStrike" kern="1200" cap="none" spc="0" normalizeH="0" baseline="0" noProof="0" dirty="0">
+              <a:ln>
+                <a:noFill/>
+              </a:ln>
+              <a:solidFill>
+                <a:srgbClr val="F79646">
+                  <a:lumMod val="75000"/>
+                </a:srgbClr>
+              </a:solidFill>
+              <a:effectLst/>
+              <a:uLnTx/>
+              <a:uFillTx/>
+              <a:latin typeface="Calibri"/>
+              <a:ea typeface="+mj-ea"/>
+              <a:cs typeface="+mj-cs"/>
+            </a:endParaRPr>
+          </a:p>
+        </p:txBody>
+      </p:sp>
+    </p:spTree>
+  </p:cSld>
+  <p:clrMapOvr>
+    <a:masterClrMapping/>
+  </p:clrMapOvr>
+  <p:timing>
+    <p:tnLst>
+      <p:par>
+        <p:cTn id="1" dur="indefinite" restart="never" nodeType="tmRoot"/>
+      </p:par>
+    </p:tnLst>
+  </p:timing>
+</p:sld>
+</file>
+
+<file path=ppt/slides/slide22.xml><?xml version="1.0" encoding="utf-8"?>
+<p:sld xmlns:a="http://schemas.openxmlformats.org/drawingml/2006/main" xmlns:r="http://schemas.openxmlformats.org/officeDocument/2006/relationships" xmlns:mc="http://schemas.openxmlformats.org/markup-compatibility/2006" xmlns:mv="urn:schemas-microsoft-com:mac:vml" xmlns:p="http://schemas.openxmlformats.org/presentationml/2006/main" mc:Ignorable="mv" mc:PreserveAttributes="mv:*">
+  <p:cSld>
+    <p:spTree>
+      <p:nvGrpSpPr>
+        <p:cNvPr id="1" name=""/>
+        <p:cNvGrpSpPr/>
+        <p:nvPr/>
+      </p:nvGrpSpPr>
+      <p:grpSpPr>
+        <a:xfrm>
+          <a:off x="0" y="0"/>
+          <a:ext cx="0" cy="0"/>
+          <a:chOff x="0" y="0"/>
+          <a:chExt cx="0" cy="0"/>
+        </a:xfrm>
+      </p:grpSpPr>
+      <p:sp>
+        <p:nvSpPr>
+          <p:cNvPr id="2" name="TextBox 1"/>
+          <p:cNvSpPr txBox="1"/>
+          <p:nvPr/>
+        </p:nvSpPr>
+        <p:spPr>
+          <a:xfrm>
+            <a:off x="609600" y="1209556"/>
+            <a:ext cx="8305800" cy="5724644"/>
+          </a:xfrm>
+          <a:prstGeom prst="rect">
+            <a:avLst/>
+          </a:prstGeom>
+          <a:noFill/>
+        </p:spPr>
+        <p:txBody>
+          <a:bodyPr wrap="square" rtlCol="0">
+            <a:spAutoFit/>
+          </a:bodyPr>
+          <a:lstStyle/>
+          <a:p>
+            <a:r>
+              <a:rPr lang="en-US" sz="2800" b="1" dirty="0" smtClean="0">
+                <a:solidFill>
+                  <a:schemeClr val="tx1">
+                    <a:lumMod val="50000"/>
+                    <a:lumOff val="50000"/>
+                  </a:schemeClr>
+                </a:solidFill>
+              </a:rPr>
+              <a:t>Extension/Clarification/Contextualization of Meaning:</a:t>
+            </a:r>
+          </a:p>
+          <a:p>
+            <a:endParaRPr lang="en-US" sz="1000" dirty="0" smtClean="0">
+              <a:solidFill>
+                <a:schemeClr val="tx1">
+                  <a:lumMod val="50000"/>
+                  <a:lumOff val="50000"/>
+                </a:schemeClr>
+              </a:solidFill>
+            </a:endParaRPr>
+          </a:p>
+          <a:p>
+            <a:r>
+              <a:rPr lang="en-US" sz="2400" b="1" u="sng" dirty="0" smtClean="0">
+                <a:solidFill>
+                  <a:schemeClr val="tx1">
+                    <a:lumMod val="50000"/>
+                    <a:lumOff val="50000"/>
+                  </a:schemeClr>
+                </a:solidFill>
+              </a:rPr>
+              <a:t>Example 1 :  </a:t>
+            </a:r>
+            <a:r>
+              <a:rPr lang="en-US" sz="2400" b="1" u="sng" dirty="0" err="1" smtClean="0">
+                <a:solidFill>
+                  <a:schemeClr val="tx1">
+                    <a:lumMod val="50000"/>
+                    <a:lumOff val="50000"/>
+                  </a:schemeClr>
+                </a:solidFill>
+              </a:rPr>
+              <a:t>OBI:material</a:t>
+            </a:r>
+            <a:r>
+              <a:rPr lang="en-US" sz="2400" b="1" u="sng" dirty="0" smtClean="0">
+                <a:solidFill>
+                  <a:schemeClr val="tx1">
+                    <a:lumMod val="50000"/>
+                    <a:lumOff val="50000"/>
+                  </a:schemeClr>
+                </a:solidFill>
+              </a:rPr>
+              <a:t> processing technique</a:t>
+            </a:r>
+          </a:p>
+          <a:p>
+            <a:r>
+              <a:rPr lang="en-US" sz="2000" b="1" dirty="0" smtClean="0">
+                <a:solidFill>
+                  <a:schemeClr val="tx1">
+                    <a:lumMod val="50000"/>
+                    <a:lumOff val="50000"/>
+                  </a:schemeClr>
+                </a:solidFill>
+              </a:rPr>
+              <a:t>OBI def </a:t>
+            </a:r>
+            <a:r>
+              <a:rPr lang="en-US" sz="2000" dirty="0" smtClean="0">
+                <a:solidFill>
+                  <a:schemeClr val="tx1">
+                    <a:lumMod val="50000"/>
+                    <a:lumOff val="50000"/>
+                  </a:schemeClr>
+                </a:solidFill>
+              </a:rPr>
+              <a:t>- A planned process which results in physical changes in a specified input material</a:t>
+            </a:r>
+          </a:p>
+          <a:p>
+            <a:endParaRPr lang="en-US" sz="1000" dirty="0" smtClean="0">
+              <a:solidFill>
+                <a:schemeClr val="tx1">
+                  <a:lumMod val="50000"/>
+                  <a:lumOff val="50000"/>
+                </a:schemeClr>
+              </a:solidFill>
+            </a:endParaRPr>
+          </a:p>
+          <a:p>
+            <a:r>
+              <a:rPr lang="en-US" sz="2000" b="1" dirty="0" err="1" smtClean="0">
+                <a:solidFill>
+                  <a:schemeClr val="tx1">
+                    <a:lumMod val="50000"/>
+                    <a:lumOff val="50000"/>
+                  </a:schemeClr>
+                </a:solidFill>
+              </a:rPr>
+              <a:t>ReO</a:t>
+            </a:r>
+            <a:r>
+              <a:rPr lang="en-US" sz="2000" b="1" dirty="0" smtClean="0">
+                <a:solidFill>
+                  <a:schemeClr val="tx1">
+                    <a:lumMod val="50000"/>
+                    <a:lumOff val="50000"/>
+                  </a:schemeClr>
+                </a:solidFill>
+              </a:rPr>
+              <a:t> def </a:t>
+            </a:r>
+            <a:r>
+              <a:rPr lang="en-US" sz="2000" dirty="0" smtClean="0">
+                <a:solidFill>
+                  <a:schemeClr val="tx1">
+                    <a:lumMod val="50000"/>
+                    <a:lumOff val="50000"/>
+                  </a:schemeClr>
+                </a:solidFill>
+              </a:rPr>
+              <a:t>- a planned process which results in specified reorganization or structural changes to some input material. This includes processes such as material component separation and combination,  as well as changes that alter the internal arrangement of an input material at a molecular or macroscopic level.</a:t>
+            </a:r>
+          </a:p>
+          <a:p>
+            <a:endParaRPr lang="en-US" sz="1000" b="1" u="sng" dirty="0" smtClean="0">
+              <a:solidFill>
+                <a:schemeClr val="tx1">
+                  <a:lumMod val="50000"/>
+                  <a:lumOff val="50000"/>
+                </a:schemeClr>
+              </a:solidFill>
+            </a:endParaRPr>
+          </a:p>
+          <a:p>
+            <a:r>
+              <a:rPr lang="en-US" sz="2400" b="1" u="sng" dirty="0" smtClean="0">
+                <a:solidFill>
+                  <a:schemeClr val="tx1">
+                    <a:lumMod val="50000"/>
+                    <a:lumOff val="50000"/>
+                  </a:schemeClr>
+                </a:solidFill>
+              </a:rPr>
+              <a:t>Example 2 :  </a:t>
+            </a:r>
+            <a:r>
+              <a:rPr lang="en-US" sz="2400" b="1" u="sng" dirty="0" err="1" smtClean="0">
+                <a:solidFill>
+                  <a:schemeClr val="tx1">
+                    <a:lumMod val="50000"/>
+                    <a:lumOff val="50000"/>
+                  </a:schemeClr>
+                </a:solidFill>
+              </a:rPr>
+              <a:t>OBI:evaluant</a:t>
+            </a:r>
+            <a:r>
+              <a:rPr lang="en-US" sz="2400" b="1" u="sng" dirty="0" smtClean="0">
+                <a:solidFill>
+                  <a:schemeClr val="tx1">
+                    <a:lumMod val="50000"/>
+                    <a:lumOff val="50000"/>
+                  </a:schemeClr>
+                </a:solidFill>
+              </a:rPr>
+              <a:t> role</a:t>
+            </a:r>
+          </a:p>
+          <a:p>
+            <a:r>
+              <a:rPr lang="en-US" sz="2000" b="1" dirty="0" smtClean="0">
+                <a:solidFill>
+                  <a:schemeClr val="tx1">
+                    <a:lumMod val="50000"/>
+                    <a:lumOff val="50000"/>
+                  </a:schemeClr>
+                </a:solidFill>
+              </a:rPr>
+              <a:t>OBI def </a:t>
+            </a:r>
+            <a:r>
+              <a:rPr lang="en-US" sz="2000" dirty="0" smtClean="0">
+                <a:solidFill>
+                  <a:schemeClr val="tx1">
+                    <a:lumMod val="50000"/>
+                    <a:lumOff val="50000"/>
+                  </a:schemeClr>
+                </a:solidFill>
+              </a:rPr>
+              <a:t>- a role that inheres in an entity that is realized in an assay in which data is generated about the bearer of the </a:t>
+            </a:r>
+            <a:r>
+              <a:rPr lang="en-US" sz="2000" dirty="0" err="1" smtClean="0">
+                <a:solidFill>
+                  <a:schemeClr val="tx1">
+                    <a:lumMod val="50000"/>
+                    <a:lumOff val="50000"/>
+                  </a:schemeClr>
+                </a:solidFill>
+              </a:rPr>
+              <a:t>evaluant</a:t>
+            </a:r>
+            <a:r>
+              <a:rPr lang="en-US" sz="2000" dirty="0" smtClean="0">
+                <a:solidFill>
+                  <a:schemeClr val="tx1">
+                    <a:lumMod val="50000"/>
+                    <a:lumOff val="50000"/>
+                  </a:schemeClr>
+                </a:solidFill>
+              </a:rPr>
+              <a:t> role</a:t>
+            </a:r>
+          </a:p>
+          <a:p>
+            <a:endParaRPr lang="en-US" sz="1000" dirty="0" smtClean="0">
+              <a:solidFill>
+                <a:schemeClr val="tx1">
+                  <a:lumMod val="50000"/>
+                  <a:lumOff val="50000"/>
+                </a:schemeClr>
+              </a:solidFill>
+            </a:endParaRPr>
+          </a:p>
+          <a:p>
+            <a:r>
+              <a:rPr lang="en-US" sz="2000" b="1" dirty="0" err="1" smtClean="0">
+                <a:solidFill>
+                  <a:schemeClr val="tx1">
+                    <a:lumMod val="50000"/>
+                    <a:lumOff val="50000"/>
+                  </a:schemeClr>
+                </a:solidFill>
+              </a:rPr>
+              <a:t>ReO</a:t>
+            </a:r>
+            <a:r>
+              <a:rPr lang="en-US" sz="2000" b="1" dirty="0" smtClean="0">
+                <a:solidFill>
+                  <a:schemeClr val="tx1">
+                    <a:lumMod val="50000"/>
+                    <a:lumOff val="50000"/>
+                  </a:schemeClr>
+                </a:solidFill>
+              </a:rPr>
+              <a:t> def </a:t>
+            </a:r>
+            <a:r>
+              <a:rPr lang="en-US" sz="2000" dirty="0" smtClean="0">
+                <a:solidFill>
+                  <a:schemeClr val="tx1">
+                    <a:lumMod val="50000"/>
+                    <a:lumOff val="50000"/>
+                  </a:schemeClr>
+                </a:solidFill>
+              </a:rPr>
+              <a:t>- a role that inheres in an entity that is </a:t>
+            </a:r>
+            <a:r>
+              <a:rPr lang="en-US" sz="2000" i="1" dirty="0" smtClean="0">
+                <a:solidFill>
+                  <a:schemeClr val="tx1">
+                    <a:lumMod val="50000"/>
+                    <a:lumOff val="50000"/>
+                  </a:schemeClr>
+                </a:solidFill>
+              </a:rPr>
+              <a:t>gained</a:t>
+            </a:r>
+            <a:r>
+              <a:rPr lang="en-US" sz="2000" dirty="0" smtClean="0">
+                <a:solidFill>
+                  <a:schemeClr val="tx1">
+                    <a:lumMod val="50000"/>
+                    <a:lumOff val="50000"/>
+                  </a:schemeClr>
+                </a:solidFill>
+              </a:rPr>
+              <a:t> through a planning process upon an agent’s intent to study the entity in some assay, and </a:t>
+            </a:r>
+            <a:r>
+              <a:rPr lang="en-US" sz="2000" i="1" dirty="0" smtClean="0">
+                <a:solidFill>
+                  <a:schemeClr val="tx1">
+                    <a:lumMod val="50000"/>
+                    <a:lumOff val="50000"/>
+                  </a:schemeClr>
+                </a:solidFill>
+              </a:rPr>
+              <a:t>realized</a:t>
+            </a:r>
+            <a:r>
+              <a:rPr lang="en-US" sz="2000" dirty="0" smtClean="0">
+                <a:solidFill>
+                  <a:schemeClr val="tx1">
+                    <a:lumMod val="50000"/>
+                    <a:lumOff val="50000"/>
+                  </a:schemeClr>
+                </a:solidFill>
+              </a:rPr>
+              <a:t> in the execution of an assay which generates data about the entity </a:t>
+            </a:r>
+            <a:endParaRPr lang="en-US" sz="1600" dirty="0" smtClean="0">
+              <a:solidFill>
+                <a:schemeClr val="tx1">
+                  <a:lumMod val="50000"/>
+                  <a:lumOff val="50000"/>
+                </a:schemeClr>
+              </a:solidFill>
+            </a:endParaRPr>
+          </a:p>
+        </p:txBody>
+      </p:sp>
+      <p:sp>
+        <p:nvSpPr>
+          <p:cNvPr id="4" name="Title 1"/>
+          <p:cNvSpPr txBox="1">
+            <a:spLocks/>
+          </p:cNvSpPr>
+          <p:nvPr/>
+        </p:nvSpPr>
+        <p:spPr>
+          <a:xfrm>
+            <a:off x="457200" y="431800"/>
+            <a:ext cx="7848600" cy="1143000"/>
+          </a:xfrm>
+          <a:prstGeom prst="rect">
+            <a:avLst/>
+          </a:prstGeom>
+        </p:spPr>
+        <p:txBody>
+          <a:bodyPr vert="horz" lIns="91440" tIns="45720" rIns="91440" bIns="45720" rtlCol="0" anchor="ctr">
+            <a:normAutofit fontScale="90000" lnSpcReduction="10000"/>
+          </a:bodyPr>
+          <a:lstStyle/>
+          <a:p>
+            <a:pPr algn="ctr" defTabSz="457200">
+              <a:spcBef>
+                <a:spcPct val="0"/>
+              </a:spcBef>
+            </a:pPr>
+            <a:r>
+              <a:rPr lang="en-US" sz="4000" dirty="0" smtClean="0">
+                <a:solidFill>
+                  <a:schemeClr val="accent6">
+                    <a:lumMod val="75000"/>
+                  </a:schemeClr>
+                </a:solidFill>
+              </a:rPr>
+              <a:t>Examples of editor-preferred definitions in </a:t>
+            </a:r>
+            <a:r>
+              <a:rPr lang="en-US" sz="4000" dirty="0" err="1" smtClean="0">
+                <a:solidFill>
+                  <a:schemeClr val="accent6">
+                    <a:lumMod val="75000"/>
+                  </a:schemeClr>
+                </a:solidFill>
+              </a:rPr>
+              <a:t>ReO</a:t>
+            </a:r>
+            <a:endParaRPr lang="en-US" sz="4000" dirty="0" smtClean="0">
+              <a:solidFill>
+                <a:schemeClr val="accent6">
+                  <a:lumMod val="75000"/>
+                </a:schemeClr>
+              </a:solidFill>
+            </a:endParaRPr>
+          </a:p>
+          <a:p>
+            <a:pPr marL="0" marR="0" lvl="0" indent="0" algn="ctr" defTabSz="457200" rtl="0" eaLnBrk="1" fontAlgn="auto" latinLnBrk="0" hangingPunct="1">
+              <a:lnSpc>
+                <a:spcPct val="100000"/>
+              </a:lnSpc>
+              <a:spcBef>
+                <a:spcPct val="0"/>
+              </a:spcBef>
+              <a:spcAft>
+                <a:spcPts val="0"/>
+              </a:spcAft>
+              <a:buClrTx/>
+              <a:buSzTx/>
+              <a:buFontTx/>
+              <a:buNone/>
+              <a:tabLst/>
+              <a:defRPr/>
+            </a:pPr>
+            <a:endParaRPr kumimoji="0" lang="en-US" sz="4400" b="0" i="0" u="none" strike="noStrike" kern="1200" cap="none" spc="0" normalizeH="0" baseline="0" noProof="0" dirty="0">
+              <a:ln>
+                <a:noFill/>
+              </a:ln>
+              <a:solidFill>
+                <a:srgbClr val="F79646">
+                  <a:lumMod val="75000"/>
+                </a:srgbClr>
+              </a:solidFill>
+              <a:effectLst/>
+              <a:uLnTx/>
+              <a:uFillTx/>
+              <a:latin typeface="Calibri"/>
+              <a:ea typeface="+mj-ea"/>
+              <a:cs typeface="+mj-cs"/>
+            </a:endParaRPr>
+          </a:p>
+        </p:txBody>
+      </p:sp>
+    </p:spTree>
+  </p:cSld>
+  <p:clrMapOvr>
+    <a:masterClrMapping/>
+  </p:clrMapOvr>
+  <p:timing>
+    <p:tnLst>
+      <p:par>
+        <p:cTn id="1" dur="indefinite" restart="never" nodeType="tmRoot"/>
+      </p:par>
+    </p:tnLst>
+  </p:timing>
+</p:sld>
+</file>
+
+<file path=ppt/slides/slide23.xml><?xml version="1.0" encoding="utf-8"?>
+<p:sld xmlns:a="http://schemas.openxmlformats.org/drawingml/2006/main" xmlns:r="http://schemas.openxmlformats.org/officeDocument/2006/relationships" xmlns:mc="http://schemas.openxmlformats.org/markup-compatibility/2006" xmlns:mv="urn:schemas-microsoft-com:mac:vml" xmlns:p="http://schemas.openxmlformats.org/presentationml/2006/main" mc:Ignorable="mv" mc:PreserveAttributes="mv:*">
+  <p:cSld>
+    <p:spTree>
+      <p:nvGrpSpPr>
+        <p:cNvPr id="1" name=""/>
+        <p:cNvGrpSpPr/>
+        <p:nvPr/>
+      </p:nvGrpSpPr>
+      <p:grpSpPr>
+        <a:xfrm>
+          <a:off x="0" y="0"/>
+          <a:ext cx="0" cy="0"/>
+          <a:chOff x="0" y="0"/>
+          <a:chExt cx="0" cy="0"/>
+        </a:xfrm>
+      </p:grpSpPr>
+      <p:sp>
+        <p:nvSpPr>
           <p:cNvPr id="2" name="Title 1"/>
           <p:cNvSpPr>
             <a:spLocks noGrp="1"/>
@@ -6284,6 +7387,285 @@
   <p:clrMapOvr>
     <a:masterClrMapping/>
   </p:clrMapOvr>
+  <p:timing>
+    <p:tnLst>
+      <p:par>
+        <p:cTn id="1" dur="indefinite" restart="never" nodeType="tmRoot"/>
+      </p:par>
+    </p:tnLst>
+  </p:timing>
+</p:sld>
+</file>
+
+<file path=ppt/slides/slide24.xml><?xml version="1.0" encoding="utf-8"?>
+<p:sld xmlns:a="http://schemas.openxmlformats.org/drawingml/2006/main" xmlns:r="http://schemas.openxmlformats.org/officeDocument/2006/relationships" xmlns:mc="http://schemas.openxmlformats.org/markup-compatibility/2006" xmlns:mv="urn:schemas-microsoft-com:mac:vml" xmlns:p="http://schemas.openxmlformats.org/presentationml/2006/main" mc:Ignorable="mv" mc:PreserveAttributes="mv:*">
+  <p:cSld>
+    <p:spTree>
+      <p:nvGrpSpPr>
+        <p:cNvPr id="1" name=""/>
+        <p:cNvGrpSpPr/>
+        <p:nvPr/>
+      </p:nvGrpSpPr>
+      <p:grpSpPr>
+        <a:xfrm>
+          <a:off x="0" y="0"/>
+          <a:ext cx="0" cy="0"/>
+          <a:chOff x="0" y="0"/>
+          <a:chExt cx="0" cy="0"/>
+        </a:xfrm>
+      </p:grpSpPr>
+      <p:sp>
+        <p:nvSpPr>
+          <p:cNvPr id="2" name="Title 1"/>
+          <p:cNvSpPr>
+            <a:spLocks noGrp="1"/>
+          </p:cNvSpPr>
+          <p:nvPr>
+            <p:ph type="title"/>
+          </p:nvPr>
+        </p:nvSpPr>
+        <p:spPr/>
+        <p:txBody>
+          <a:bodyPr/>
+          <a:lstStyle/>
+          <a:p>
+            <a:r>
+              <a:rPr lang="en-US" dirty="0" smtClean="0"/>
+              <a:t>Decisions</a:t>
+            </a:r>
+            <a:endParaRPr lang="en-US" dirty="0"/>
+          </a:p>
+        </p:txBody>
+      </p:sp>
+      <p:sp>
+        <p:nvSpPr>
+          <p:cNvPr id="3" name="Content Placeholder 2"/>
+          <p:cNvSpPr>
+            <a:spLocks noGrp="1"/>
+          </p:cNvSpPr>
+          <p:nvPr>
+            <p:ph idx="1"/>
+          </p:nvPr>
+        </p:nvSpPr>
+        <p:spPr/>
+        <p:txBody>
+          <a:bodyPr>
+            <a:normAutofit fontScale="55000" lnSpcReduction="20000"/>
+          </a:bodyPr>
+          <a:lstStyle/>
+          <a:p>
+            <a:r>
+              <a:rPr lang="en-US" dirty="0" smtClean="0"/>
+              <a:t>AI: Write a white paper, starting form these slides that summarize the needs and flash out </a:t>
+            </a:r>
+            <a:r>
+              <a:rPr lang="en-US" dirty="0" smtClean="0"/>
+              <a:t>proposals</a:t>
+            </a:r>
+          </a:p>
+          <a:p>
+            <a:pPr>
+              <a:buNone/>
+            </a:pPr>
+            <a:r>
+              <a:rPr lang="en-US" dirty="0" smtClean="0"/>
+              <a:t>	</a:t>
+            </a:r>
+            <a:r>
+              <a:rPr lang="en-US" dirty="0" smtClean="0"/>
+              <a:t>Start form this paper:</a:t>
+            </a:r>
+            <a:r>
+              <a:rPr lang="en-US" u="sng" dirty="0" smtClean="0">
+                <a:hlinkClick r:id="rId2"/>
+              </a:rPr>
+              <a:t>http://www.ncbi.nlm.nih.gov/pmc/articles/PMC2684543/</a:t>
+            </a:r>
+            <a:endParaRPr lang="en-US" dirty="0" smtClean="0"/>
+          </a:p>
+          <a:p>
+            <a:pPr>
+              <a:buNone/>
+            </a:pPr>
+            <a:endParaRPr lang="en-US" dirty="0" smtClean="0"/>
+          </a:p>
+          <a:p>
+            <a:pPr>
+              <a:buNone/>
+            </a:pPr>
+            <a:r>
+              <a:rPr lang="en-US" dirty="0" smtClean="0"/>
+              <a:t>	</a:t>
+            </a:r>
+            <a:r>
+              <a:rPr lang="en-US" dirty="0" smtClean="0"/>
+              <a:t>1</a:t>
+            </a:r>
+            <a:r>
+              <a:rPr lang="en-US" dirty="0" smtClean="0"/>
+              <a:t>) for the 'application specific label' a subclass of alternative term creating an application specific </a:t>
+            </a:r>
+            <a:r>
+              <a:rPr lang="en-US" dirty="0" err="1" smtClean="0"/>
+              <a:t>label"eagle-i</a:t>
+            </a:r>
+            <a:r>
+              <a:rPr lang="en-US" dirty="0" smtClean="0"/>
+              <a:t> alternative term" "</a:t>
+            </a:r>
+            <a:r>
+              <a:rPr lang="en-US" dirty="0" err="1" smtClean="0"/>
+              <a:t>ReO</a:t>
+            </a:r>
+            <a:r>
+              <a:rPr lang="en-US" dirty="0" smtClean="0"/>
+              <a:t> alternative </a:t>
+            </a:r>
+            <a:r>
+              <a:rPr lang="en-US" dirty="0" smtClean="0"/>
+              <a:t>term”</a:t>
+            </a:r>
+          </a:p>
+          <a:p>
+            <a:pPr>
+              <a:buNone/>
+            </a:pPr>
+            <a:r>
+              <a:rPr lang="en-US" dirty="0" smtClean="0"/>
+              <a:t>	</a:t>
+            </a:r>
+            <a:r>
+              <a:rPr lang="en-US" dirty="0" smtClean="0"/>
+              <a:t>2</a:t>
+            </a:r>
+            <a:r>
+              <a:rPr lang="en-US" dirty="0" smtClean="0"/>
+              <a:t>) There is going to be the "alternative description" is going to be a new IAO </a:t>
+            </a:r>
+            <a:r>
+              <a:rPr lang="en-US" dirty="0" err="1" smtClean="0"/>
+              <a:t>property.Then</a:t>
+            </a:r>
+            <a:r>
+              <a:rPr lang="en-US" dirty="0" smtClean="0"/>
+              <a:t> we can have subclasses under this like "</a:t>
+            </a:r>
+            <a:r>
+              <a:rPr lang="en-US" dirty="0" err="1" smtClean="0"/>
+              <a:t>ReO</a:t>
+            </a:r>
+            <a:r>
+              <a:rPr lang="en-US" dirty="0" smtClean="0"/>
+              <a:t> alternative Description" "IEDB alternative description" as for the </a:t>
+            </a:r>
+            <a:r>
+              <a:rPr lang="en-US" dirty="0" err="1" smtClean="0"/>
+              <a:t>applicvaiton</a:t>
+            </a:r>
+            <a:r>
+              <a:rPr lang="en-US" dirty="0" smtClean="0"/>
+              <a:t> specific label   </a:t>
+            </a:r>
+            <a:r>
+              <a:rPr lang="en-US" dirty="0" smtClean="0"/>
+              <a:t> </a:t>
+            </a:r>
+          </a:p>
+          <a:p>
+            <a:pPr>
+              <a:buNone/>
+            </a:pPr>
+            <a:r>
+              <a:rPr lang="en-US" dirty="0" smtClean="0"/>
+              <a:t>      </a:t>
+            </a:r>
+            <a:r>
+              <a:rPr lang="en-US" dirty="0" smtClean="0"/>
+              <a:t>3) For the application specific restriction     - use </a:t>
+            </a:r>
+            <a:r>
+              <a:rPr lang="en-US" dirty="0" err="1" smtClean="0"/>
+              <a:t>insubset</a:t>
+            </a:r>
+            <a:r>
+              <a:rPr lang="en-US" dirty="0" smtClean="0"/>
+              <a:t> with a set of standard instance value (created in IAO</a:t>
+            </a:r>
+            <a:r>
+              <a:rPr lang="en-US" dirty="0" smtClean="0"/>
+              <a:t>)</a:t>
+            </a:r>
+          </a:p>
+          <a:p>
+            <a:pPr>
+              <a:buNone/>
+            </a:pPr>
+            <a:r>
+              <a:rPr lang="en-US" dirty="0" smtClean="0"/>
+              <a:t>      4</a:t>
+            </a:r>
+            <a:r>
+              <a:rPr lang="en-US" dirty="0" smtClean="0"/>
+              <a:t>) It would be nice to have tracker items linked to terms     - For this purpose we should use the 'require discussion' instance value under the </a:t>
+            </a:r>
+            <a:r>
+              <a:rPr lang="en-US" dirty="0" err="1" smtClean="0"/>
+              <a:t>curation</a:t>
+            </a:r>
+            <a:r>
+              <a:rPr lang="en-US" dirty="0" smtClean="0"/>
+              <a:t> status </a:t>
+            </a:r>
+            <a:r>
+              <a:rPr lang="en-US" dirty="0" smtClean="0"/>
+              <a:t>specification</a:t>
+            </a:r>
+          </a:p>
+          <a:p>
+            <a:pPr>
+              <a:buNone/>
+            </a:pPr>
+            <a:r>
+              <a:rPr lang="en-US" dirty="0" smtClean="0"/>
+              <a:t>      5</a:t>
+            </a:r>
+            <a:r>
+              <a:rPr lang="en-US" dirty="0" smtClean="0"/>
+              <a:t>) Rename curator note in "internal note" this property can be used </a:t>
+            </a:r>
+            <a:r>
+              <a:rPr lang="en-US" dirty="0" err="1" smtClean="0"/>
+              <a:t>ot</a:t>
+            </a:r>
+            <a:r>
+              <a:rPr lang="en-US" dirty="0" smtClean="0"/>
+              <a:t> keep track of tracker </a:t>
+            </a:r>
+            <a:r>
+              <a:rPr lang="en-US" dirty="0" smtClean="0"/>
+              <a:t>items</a:t>
+            </a:r>
+          </a:p>
+          <a:p>
+            <a:pPr>
+              <a:buNone/>
+            </a:pPr>
+            <a:endParaRPr lang="en-US" dirty="0" smtClean="0"/>
+          </a:p>
+        </p:txBody>
+      </p:sp>
+    </p:spTree>
+  </p:cSld>
+  <p:clrMapOvr>
+    <a:masterClrMapping/>
+  </p:clrMapOvr>
+  <p:timing>
+    <p:tnLst>
+      <p:par>
+        <p:cTn id="1" dur="indefinite" restart="never" nodeType="tmRoot"/>
+      </p:par>
+    </p:tnLst>
+  </p:timing>
 </p:sld>
 </file>
 
@@ -6373,6 +7755,13 @@
   <p:clrMapOvr>
     <a:masterClrMapping/>
   </p:clrMapOvr>
+  <p:timing>
+    <p:tnLst>
+      <p:par>
+        <p:cTn id="1" dur="indefinite" restart="never" nodeType="tmRoot"/>
+      </p:par>
+    </p:tnLst>
+  </p:timing>
 </p:sld>
 </file>
 
@@ -6510,6 +7899,13 @@
   <p:clrMapOvr>
     <a:masterClrMapping/>
   </p:clrMapOvr>
+  <p:timing>
+    <p:tnLst>
+      <p:par>
+        <p:cTn id="1" dur="indefinite" restart="never" nodeType="tmRoot"/>
+      </p:par>
+    </p:tnLst>
+  </p:timing>
 </p:sld>
 </file>
 
@@ -6680,6 +8076,13 @@
   <p:clrMapOvr>
     <a:masterClrMapping/>
   </p:clrMapOvr>
+  <p:timing>
+    <p:tnLst>
+      <p:par>
+        <p:cTn id="1" dur="indefinite" restart="never" nodeType="tmRoot"/>
+      </p:par>
+    </p:tnLst>
+  </p:timing>
 </p:sld>
 </file>
 
@@ -6771,6 +8174,13 @@
   <p:clrMapOvr>
     <a:masterClrMapping/>
   </p:clrMapOvr>
+  <p:timing>
+    <p:tnLst>
+      <p:par>
+        <p:cTn id="1" dur="indefinite" restart="never" nodeType="tmRoot"/>
+      </p:par>
+    </p:tnLst>
+  </p:timing>
 </p:sld>
 </file>
 
@@ -6862,6 +8272,13 @@
   <p:clrMapOvr>
     <a:masterClrMapping/>
   </p:clrMapOvr>
+  <p:timing>
+    <p:tnLst>
+      <p:par>
+        <p:cTn id="1" dur="indefinite" restart="never" nodeType="tmRoot"/>
+      </p:par>
+    </p:tnLst>
+  </p:timing>
 </p:sld>
 </file>
 
@@ -6953,6 +8370,13 @@
   <p:clrMapOvr>
     <a:masterClrMapping/>
   </p:clrMapOvr>
+  <p:timing>
+    <p:tnLst>
+      <p:par>
+        <p:cTn id="1" dur="indefinite" restart="never" nodeType="tmRoot"/>
+      </p:par>
+    </p:tnLst>
+  </p:timing>
 </p:sld>
 </file>
 
@@ -7044,6 +8468,13 @@
   <p:clrMapOvr>
     <a:masterClrMapping/>
   </p:clrMapOvr>
+  <p:timing>
+    <p:tnLst>
+      <p:par>
+        <p:cTn id="1" dur="indefinite" restart="never" nodeType="tmRoot"/>
+      </p:par>
+    </p:tnLst>
+  </p:timing>
 </p:sld>
 </file>
 

</xml_diff>

<commit_message>
updated slides about metadata
</commit_message>
<xml_diff>
--- a/docs/presentations/OBI workshop Oct 2011 Philly/Metadata_requirements.pptx
+++ b/docs/presentations/OBI workshop Oct 2011 Philly/Metadata_requirements.pptx
@@ -216,7 +216,7 @@
             <a:fld id="{BDDC10C9-0186-9D4B-9D91-8693977AA307}" type="datetimeFigureOut">
               <a:rPr lang="en-US" smtClean="0"/>
               <a:pPr/>
-              <a:t>10/14/11</a:t>
+              <a:t>10/15/11</a:t>
             </a:fld>
             <a:endParaRPr lang="en-US"/>
           </a:p>
@@ -1143,7 +1143,7 @@
             <a:fld id="{2E0C2E5F-398D-4245-92E7-D7433FDDBBC6}" type="datetimeFigureOut">
               <a:rPr lang="en-US" smtClean="0"/>
               <a:pPr/>
-              <a:t>10/14/11</a:t>
+              <a:t>10/15/11</a:t>
             </a:fld>
             <a:endParaRPr lang="en-US"/>
           </a:p>
@@ -1310,7 +1310,7 @@
             <a:fld id="{2E0C2E5F-398D-4245-92E7-D7433FDDBBC6}" type="datetimeFigureOut">
               <a:rPr lang="en-US" smtClean="0"/>
               <a:pPr/>
-              <a:t>10/14/11</a:t>
+              <a:t>10/15/11</a:t>
             </a:fld>
             <a:endParaRPr lang="en-US"/>
           </a:p>
@@ -1487,7 +1487,7 @@
             <a:fld id="{2E0C2E5F-398D-4245-92E7-D7433FDDBBC6}" type="datetimeFigureOut">
               <a:rPr lang="en-US" smtClean="0"/>
               <a:pPr/>
-              <a:t>10/14/11</a:t>
+              <a:t>10/15/11</a:t>
             </a:fld>
             <a:endParaRPr lang="en-US"/>
           </a:p>
@@ -1705,7 +1705,7 @@
             <a:fld id="{2E0C2E5F-398D-4245-92E7-D7433FDDBBC6}" type="datetimeFigureOut">
               <a:rPr lang="en-US" smtClean="0"/>
               <a:pPr/>
-              <a:t>10/14/11</a:t>
+              <a:t>10/15/11</a:t>
             </a:fld>
             <a:endParaRPr lang="en-US"/>
           </a:p>
@@ -1948,7 +1948,7 @@
             <a:fld id="{2E0C2E5F-398D-4245-92E7-D7433FDDBBC6}" type="datetimeFigureOut">
               <a:rPr lang="en-US" smtClean="0"/>
               <a:pPr/>
-              <a:t>10/14/11</a:t>
+              <a:t>10/15/11</a:t>
             </a:fld>
             <a:endParaRPr lang="en-US"/>
           </a:p>
@@ -2233,7 +2233,7 @@
             <a:fld id="{2E0C2E5F-398D-4245-92E7-D7433FDDBBC6}" type="datetimeFigureOut">
               <a:rPr lang="en-US" smtClean="0"/>
               <a:pPr/>
-              <a:t>10/14/11</a:t>
+              <a:t>10/15/11</a:t>
             </a:fld>
             <a:endParaRPr lang="en-US"/>
           </a:p>
@@ -2652,7 +2652,7 @@
             <a:fld id="{2E0C2E5F-398D-4245-92E7-D7433FDDBBC6}" type="datetimeFigureOut">
               <a:rPr lang="en-US" smtClean="0"/>
               <a:pPr/>
-              <a:t>10/14/11</a:t>
+              <a:t>10/15/11</a:t>
             </a:fld>
             <a:endParaRPr lang="en-US"/>
           </a:p>
@@ -2767,7 +2767,7 @@
             <a:fld id="{2E0C2E5F-398D-4245-92E7-D7433FDDBBC6}" type="datetimeFigureOut">
               <a:rPr lang="en-US" smtClean="0"/>
               <a:pPr/>
-              <a:t>10/14/11</a:t>
+              <a:t>10/15/11</a:t>
             </a:fld>
             <a:endParaRPr lang="en-US"/>
           </a:p>
@@ -2859,7 +2859,7 @@
             <a:fld id="{2E0C2E5F-398D-4245-92E7-D7433FDDBBC6}" type="datetimeFigureOut">
               <a:rPr lang="en-US" smtClean="0"/>
               <a:pPr/>
-              <a:t>10/14/11</a:t>
+              <a:t>10/15/11</a:t>
             </a:fld>
             <a:endParaRPr lang="en-US"/>
           </a:p>
@@ -3133,7 +3133,7 @@
             <a:fld id="{2E0C2E5F-398D-4245-92E7-D7433FDDBBC6}" type="datetimeFigureOut">
               <a:rPr lang="en-US" smtClean="0"/>
               <a:pPr/>
-              <a:t>10/14/11</a:t>
+              <a:t>10/15/11</a:t>
             </a:fld>
             <a:endParaRPr lang="en-US"/>
           </a:p>
@@ -3383,7 +3383,7 @@
             <a:fld id="{2E0C2E5F-398D-4245-92E7-D7433FDDBBC6}" type="datetimeFigureOut">
               <a:rPr lang="en-US" smtClean="0"/>
               <a:pPr/>
-              <a:t>10/14/11</a:t>
+              <a:t>10/15/11</a:t>
             </a:fld>
             <a:endParaRPr lang="en-US"/>
           </a:p>
@@ -3593,7 +3593,7 @@
             <a:fld id="{2E0C2E5F-398D-4245-92E7-D7433FDDBBC6}" type="datetimeFigureOut">
               <a:rPr lang="en-US" smtClean="0"/>
               <a:pPr/>
-              <a:t>10/14/11</a:t>
+              <a:t>10/15/11</a:t>
             </a:fld>
             <a:endParaRPr lang="en-US"/>
           </a:p>
@@ -6228,7 +6228,6 @@
               <a:rPr lang="en-US" sz="3000" b="1" dirty="0" smtClean="0"/>
               <a:t>“Alternative description”</a:t>
             </a:r>
-            <a:endParaRPr lang="en-US" sz="3000" b="1" dirty="0" smtClean="0"/>
           </a:p>
           <a:p>
             <a:pPr lvl="1"/>
@@ -7450,13 +7449,20 @@
         <p:spPr/>
         <p:txBody>
           <a:bodyPr>
-            <a:normAutofit fontScale="55000" lnSpcReduction="20000"/>
+            <a:normAutofit fontScale="47500" lnSpcReduction="20000"/>
           </a:bodyPr>
           <a:lstStyle/>
           <a:p>
-            <a:r>
-              <a:rPr lang="en-US" dirty="0" smtClean="0"/>
-              <a:t>AI: Write a white paper, starting form these slides that summarize the needs and flash out </a:t>
+            <a:pPr>
+              <a:buNone/>
+            </a:pPr>
+            <a:r>
+              <a:rPr lang="en-US" dirty="0" err="1" smtClean="0"/>
+              <a:t>AIs</a:t>
+            </a:r>
+            <a:r>
+              <a:rPr lang="en-US" dirty="0" smtClean="0"/>
+              <a:t>: Write a white paper, starting from these slides that summarize the needs and flash out </a:t>
             </a:r>
             <a:r>
               <a:rPr lang="en-US" dirty="0" smtClean="0"/>
@@ -7469,19 +7475,12 @@
             </a:pPr>
             <a:r>
               <a:rPr lang="en-US" dirty="0" smtClean="0"/>
-              <a:t>	</a:t>
-            </a:r>
-            <a:r>
-              <a:rPr lang="en-US" dirty="0" smtClean="0"/>
-              <a:t>Start form this paper:</a:t>
-            </a:r>
-            <a:r>
-              <a:rPr lang="en-US" u="sng" dirty="0" smtClean="0">
-                <a:hlinkClick r:id="rId2"/>
-              </a:rPr>
-              <a:t>http://www.ncbi.nlm.nih.gov/pmc/articles/PMC2684543/</a:t>
-            </a:r>
-            <a:endParaRPr lang="en-US" dirty="0" smtClean="0"/>
+              <a:t>(Start form this paper: http://www.ncbi.nlm.nih.gov/pmc/articles/PMC2684543/</a:t>
+            </a:r>
+            <a:r>
+              <a:rPr lang="en-US" dirty="0" smtClean="0"/>
+              <a:t>)</a:t>
+            </a:r>
           </a:p>
           <a:p>
             <a:pPr>
@@ -7495,19 +7494,20 @@
             </a:pPr>
             <a:r>
               <a:rPr lang="en-US" dirty="0" smtClean="0"/>
-              <a:t>	</a:t>
-            </a:r>
-            <a:r>
-              <a:rPr lang="en-US" dirty="0" smtClean="0"/>
-              <a:t>1</a:t>
-            </a:r>
-            <a:r>
-              <a:rPr lang="en-US" dirty="0" smtClean="0"/>
-              <a:t>) for the 'application specific label' a subclass of alternative term creating an application specific </a:t>
+              <a:t>Ideas/decisions:</a:t>
+            </a:r>
+          </a:p>
+          <a:p>
+            <a:pPr>
+              <a:buNone/>
+            </a:pPr>
+            <a:r>
+              <a:rPr lang="en-US" dirty="0" smtClean="0"/>
+              <a:t>1) for the 'application specific label' have a subclass of alternative term creating an application specific label such as: "eagle-</a:t>
             </a:r>
             <a:r>
               <a:rPr lang="en-US" dirty="0" err="1" smtClean="0"/>
-              <a:t>label"eagle-i</a:t>
+              <a:t>i</a:t>
             </a:r>
             <a:r>
               <a:rPr lang="en-US" dirty="0" smtClean="0"/>
@@ -7519,36 +7519,31 @@
             </a:r>
             <a:r>
               <a:rPr lang="en-US" dirty="0" smtClean="0"/>
-              <a:t> alternative </a:t>
-            </a:r>
-            <a:r>
-              <a:rPr lang="en-US" dirty="0" smtClean="0"/>
-              <a:t>term”</a:t>
+              <a:t> alternative term"</a:t>
             </a:r>
           </a:p>
           <a:p>
             <a:pPr>
               <a:buNone/>
             </a:pPr>
-            <a:r>
-              <a:rPr lang="en-US" dirty="0" smtClean="0"/>
-              <a:t>	</a:t>
-            </a:r>
-            <a:r>
-              <a:rPr lang="en-US" dirty="0" smtClean="0"/>
-              <a:t>2</a:t>
-            </a:r>
-            <a:r>
-              <a:rPr lang="en-US" dirty="0" smtClean="0"/>
-              <a:t>) There is going to be the "alternative description" is going to be a new IAO </a:t>
-            </a:r>
-            <a:r>
-              <a:rPr lang="en-US" dirty="0" err="1" smtClean="0"/>
-              <a:t>property.Then</a:t>
-            </a:r>
-            <a:r>
-              <a:rPr lang="en-US" dirty="0" smtClean="0"/>
-              <a:t> we can have subclasses under this like "</a:t>
+            <a:endParaRPr lang="en-US" dirty="0" smtClean="0"/>
+          </a:p>
+          <a:p>
+            <a:pPr>
+              <a:buNone/>
+            </a:pPr>
+            <a:r>
+              <a:rPr lang="en-US" dirty="0" smtClean="0"/>
+              <a:t>2) There is going to be the "alternative description" is going to be a new IAO property.</a:t>
+            </a:r>
+          </a:p>
+          <a:p>
+            <a:pPr>
+              <a:buNone/>
+            </a:pPr>
+            <a:r>
+              <a:rPr lang="en-US" dirty="0" smtClean="0"/>
+              <a:t>Then we can have subclasses under this like "</a:t>
             </a:r>
             <a:r>
               <a:rPr lang="en-US" dirty="0" err="1" smtClean="0"/>
@@ -7556,19 +7551,7 @@
             </a:r>
             <a:r>
               <a:rPr lang="en-US" dirty="0" smtClean="0"/>
-              <a:t> alternative Description" "IEDB alternative description" as for the </a:t>
-            </a:r>
-            <a:r>
-              <a:rPr lang="en-US" dirty="0" err="1" smtClean="0"/>
-              <a:t>applicvaiton</a:t>
-            </a:r>
-            <a:r>
-              <a:rPr lang="en-US" dirty="0" smtClean="0"/>
-              <a:t> specific label   </a:t>
-            </a:r>
-            <a:r>
-              <a:rPr lang="en-US" dirty="0" smtClean="0"/>
-              <a:t> </a:t>
+              <a:t> alternative description" "IEDB alternative description" as for the application specific label</a:t>
             </a:r>
           </a:p>
           <a:p>
@@ -7577,11 +7560,25 @@
             </a:pPr>
             <a:r>
               <a:rPr lang="en-US" dirty="0" smtClean="0"/>
-              <a:t>      </a:t>
-            </a:r>
-            <a:r>
-              <a:rPr lang="en-US" dirty="0" smtClean="0"/>
-              <a:t>3) For the application specific restriction     - use </a:t>
+              <a:t>     </a:t>
+            </a:r>
+          </a:p>
+          <a:p>
+            <a:pPr>
+              <a:buNone/>
+            </a:pPr>
+            <a:r>
+              <a:rPr lang="en-US" dirty="0" smtClean="0"/>
+              <a:t>3) For the application specific restriction</a:t>
+            </a:r>
+          </a:p>
+          <a:p>
+            <a:pPr>
+              <a:buNone/>
+            </a:pPr>
+            <a:r>
+              <a:rPr lang="en-US" dirty="0" smtClean="0"/>
+              <a:t>     - use “</a:t>
             </a:r>
             <a:r>
               <a:rPr lang="en-US" dirty="0" err="1" smtClean="0"/>
@@ -7589,24 +7586,31 @@
             </a:r>
             <a:r>
               <a:rPr lang="en-US" dirty="0" smtClean="0"/>
-              <a:t> with a set of standard instance value (created in IAO</a:t>
-            </a:r>
-            <a:r>
-              <a:rPr lang="en-US" dirty="0" smtClean="0"/>
-              <a:t>)</a:t>
+              <a:t>” with a set of standard instance value (created in IAO)</a:t>
             </a:r>
           </a:p>
           <a:p>
             <a:pPr>
               <a:buNone/>
             </a:pPr>
-            <a:r>
-              <a:rPr lang="en-US" dirty="0" smtClean="0"/>
-              <a:t>      4</a:t>
-            </a:r>
-            <a:r>
-              <a:rPr lang="en-US" dirty="0" smtClean="0"/>
-              <a:t>) It would be nice to have tracker items linked to terms     - For this purpose we should use the 'require discussion' instance value under the </a:t>
+            <a:endParaRPr lang="en-US" dirty="0" smtClean="0"/>
+          </a:p>
+          <a:p>
+            <a:pPr>
+              <a:buNone/>
+            </a:pPr>
+            <a:r>
+              <a:rPr lang="en-US" dirty="0" smtClean="0"/>
+              <a:t>4) It would be nice to have tracker items linked to terms</a:t>
+            </a:r>
+          </a:p>
+          <a:p>
+            <a:pPr>
+              <a:buNone/>
+            </a:pPr>
+            <a:r>
+              <a:rPr lang="en-US" dirty="0" smtClean="0"/>
+              <a:t>     - For this purpose we should use the 'require discussion' instance value under the </a:t>
             </a:r>
             <a:r>
               <a:rPr lang="en-US" dirty="0" err="1" smtClean="0"/>
@@ -7614,24 +7618,22 @@
             </a:r>
             <a:r>
               <a:rPr lang="en-US" dirty="0" smtClean="0"/>
-              <a:t> status </a:t>
-            </a:r>
-            <a:r>
-              <a:rPr lang="en-US" dirty="0" smtClean="0"/>
-              <a:t>specification</a:t>
+              <a:t> status specification</a:t>
             </a:r>
           </a:p>
           <a:p>
             <a:pPr>
               <a:buNone/>
             </a:pPr>
-            <a:r>
-              <a:rPr lang="en-US" dirty="0" smtClean="0"/>
-              <a:t>      5</a:t>
-            </a:r>
-            <a:r>
-              <a:rPr lang="en-US" dirty="0" smtClean="0"/>
-              <a:t>) Rename curator note in "internal note" this property can be used </a:t>
+            <a:endParaRPr lang="en-US" dirty="0" smtClean="0"/>
+          </a:p>
+          <a:p>
+            <a:pPr>
+              <a:buNone/>
+            </a:pPr>
+            <a:r>
+              <a:rPr lang="en-US" dirty="0" smtClean="0"/>
+              <a:t>5) Rename curator note in "internal note" this property can be used </a:t>
             </a:r>
             <a:r>
               <a:rPr lang="en-US" dirty="0" err="1" smtClean="0"/>
@@ -7639,17 +7641,8 @@
             </a:r>
             <a:r>
               <a:rPr lang="en-US" dirty="0" smtClean="0"/>
-              <a:t> keep track of tracker </a:t>
-            </a:r>
-            <a:r>
-              <a:rPr lang="en-US" dirty="0" smtClean="0"/>
-              <a:t>items</a:t>
-            </a:r>
-          </a:p>
-          <a:p>
-            <a:pPr>
-              <a:buNone/>
-            </a:pPr>
+              <a:t> keep track of tracker items as well</a:t>
+            </a:r>
             <a:endParaRPr lang="en-US" dirty="0" smtClean="0"/>
           </a:p>
         </p:txBody>

</xml_diff>